<commit_message>
fix quiz + slide
</commit_message>
<xml_diff>
--- a/RBT_Quiz.pptx
+++ b/RBT_Quiz.pptx
@@ -15661,7 +15661,7 @@
                 <a:ea typeface="Roboto Black" panose="02000000000000000000" pitchFamily="2" charset="0"/>
                 <a:cs typeface="Latha" panose="020B0604020202020204" pitchFamily="34" charset="0"/>
               </a:rPr>
-              <a:t>Câu 7: Cây sau khi thêm nút 12</a:t>
+              <a:t>Câu 7: Cây sau khi thêm node 12</a:t>
             </a:r>
           </a:p>
         </p:txBody>
@@ -16343,88 +16343,6 @@
             <a:schemeClr val="dk1"/>
           </a:fillRef>
           <a:effectRef idx="0">
-            <a:schemeClr val="dk1"/>
-          </a:effectRef>
-          <a:fontRef idx="minor">
-            <a:schemeClr val="tx1"/>
-          </a:fontRef>
-        </p:style>
-      </p:cxnSp>
-      <p:cxnSp>
-        <p:nvCxnSpPr>
-          <p:cNvPr id="126" name="Straight Arrow Connector 125">
-            <a:extLst>
-              <a:ext uri="{FF2B5EF4-FFF2-40B4-BE49-F238E27FC236}">
-                <a16:creationId xmlns:a16="http://schemas.microsoft.com/office/drawing/2014/main" id="{01C61BCB-2DDA-4CA9-BB9A-16AF93790C90}"/>
-              </a:ext>
-            </a:extLst>
-          </p:cNvPr>
-          <p:cNvCxnSpPr>
-            <a:cxnSpLocks/>
-          </p:cNvCxnSpPr>
-          <p:nvPr/>
-        </p:nvCxnSpPr>
-        <p:spPr>
-          <a:xfrm>
-            <a:off x="5908012" y="2964966"/>
-            <a:ext cx="312590" cy="364022"/>
-          </a:xfrm>
-          <a:prstGeom prst="straightConnector1">
-            <a:avLst/>
-          </a:prstGeom>
-          <a:ln>
-            <a:tailEnd type="triangle"/>
-          </a:ln>
-        </p:spPr>
-        <p:style>
-          <a:lnRef idx="2">
-            <a:schemeClr val="dk1"/>
-          </a:lnRef>
-          <a:fillRef idx="0">
-            <a:schemeClr val="dk1"/>
-          </a:fillRef>
-          <a:effectRef idx="1">
-            <a:schemeClr val="dk1"/>
-          </a:effectRef>
-          <a:fontRef idx="minor">
-            <a:schemeClr val="tx1"/>
-          </a:fontRef>
-        </p:style>
-      </p:cxnSp>
-      <p:cxnSp>
-        <p:nvCxnSpPr>
-          <p:cNvPr id="132" name="Straight Arrow Connector 131">
-            <a:extLst>
-              <a:ext uri="{FF2B5EF4-FFF2-40B4-BE49-F238E27FC236}">
-                <a16:creationId xmlns:a16="http://schemas.microsoft.com/office/drawing/2014/main" id="{ED411641-98FA-4215-822F-5C9546D9ED4E}"/>
-              </a:ext>
-            </a:extLst>
-          </p:cNvPr>
-          <p:cNvCxnSpPr>
-            <a:cxnSpLocks/>
-          </p:cNvCxnSpPr>
-          <p:nvPr/>
-        </p:nvCxnSpPr>
-        <p:spPr>
-          <a:xfrm flipH="1">
-            <a:off x="4872038" y="2996698"/>
-            <a:ext cx="289013" cy="329952"/>
-          </a:xfrm>
-          <a:prstGeom prst="straightConnector1">
-            <a:avLst/>
-          </a:prstGeom>
-          <a:ln>
-            <a:tailEnd type="triangle"/>
-          </a:ln>
-        </p:spPr>
-        <p:style>
-          <a:lnRef idx="2">
-            <a:schemeClr val="dk1"/>
-          </a:lnRef>
-          <a:fillRef idx="0">
-            <a:schemeClr val="dk1"/>
-          </a:fillRef>
-          <a:effectRef idx="1">
             <a:schemeClr val="dk1"/>
           </a:effectRef>
           <a:fontRef idx="minor">
@@ -16545,102 +16463,14 @@
                             </p:stCondLst>
                             <p:childTnLst>
                               <p:par>
-                                <p:cTn id="5" presetID="22" presetClass="entr" presetSubtype="1" fill="hold" nodeType="clickEffect">
-                                  <p:stCondLst>
-                                    <p:cond delay="0"/>
-                                  </p:stCondLst>
-                                  <p:childTnLst>
-                                    <p:set>
-                                      <p:cBhvr>
-                                        <p:cTn id="6" dur="1" fill="hold">
-                                          <p:stCondLst>
-                                            <p:cond delay="0"/>
-                                          </p:stCondLst>
-                                        </p:cTn>
-                                        <p:tgtEl>
-                                          <p:spTgt spid="126"/>
-                                        </p:tgtEl>
-                                        <p:attrNameLst>
-                                          <p:attrName>style.visibility</p:attrName>
-                                        </p:attrNameLst>
-                                      </p:cBhvr>
-                                      <p:to>
-                                        <p:strVal val="visible"/>
-                                      </p:to>
-                                    </p:set>
-                                    <p:animEffect transition="in" filter="wipe(up)">
-                                      <p:cBhvr>
-                                        <p:cTn id="7" dur="500"/>
-                                        <p:tgtEl>
-                                          <p:spTgt spid="126"/>
-                                        </p:tgtEl>
-                                      </p:cBhvr>
-                                    </p:animEffect>
-                                  </p:childTnLst>
-                                </p:cTn>
-                              </p:par>
-                              <p:par>
-                                <p:cTn id="8" presetID="22" presetClass="entr" presetSubtype="1" fill="hold" nodeType="withEffect">
-                                  <p:stCondLst>
-                                    <p:cond delay="0"/>
-                                  </p:stCondLst>
-                                  <p:childTnLst>
-                                    <p:set>
-                                      <p:cBhvr>
-                                        <p:cTn id="9" dur="1" fill="hold">
-                                          <p:stCondLst>
-                                            <p:cond delay="0"/>
-                                          </p:stCondLst>
-                                        </p:cTn>
-                                        <p:tgtEl>
-                                          <p:spTgt spid="132"/>
-                                        </p:tgtEl>
-                                        <p:attrNameLst>
-                                          <p:attrName>style.visibility</p:attrName>
-                                        </p:attrNameLst>
-                                      </p:cBhvr>
-                                      <p:to>
-                                        <p:strVal val="visible"/>
-                                      </p:to>
-                                    </p:set>
-                                    <p:animEffect transition="in" filter="wipe(up)">
-                                      <p:cBhvr>
-                                        <p:cTn id="10" dur="500"/>
-                                        <p:tgtEl>
-                                          <p:spTgt spid="132"/>
-                                        </p:tgtEl>
-                                      </p:cBhvr>
-                                    </p:animEffect>
-                                  </p:childTnLst>
-                                </p:cTn>
-                              </p:par>
-                            </p:childTnLst>
-                          </p:cTn>
-                        </p:par>
-                      </p:childTnLst>
-                    </p:cTn>
-                  </p:par>
-                  <p:par>
-                    <p:cTn id="11" fill="hold">
-                      <p:stCondLst>
-                        <p:cond delay="indefinite"/>
-                      </p:stCondLst>
-                      <p:childTnLst>
-                        <p:par>
-                          <p:cTn id="12" fill="hold">
-                            <p:stCondLst>
-                              <p:cond delay="0"/>
-                            </p:stCondLst>
-                            <p:childTnLst>
-                              <p:par>
-                                <p:cTn id="13" presetID="1" presetClass="emph" presetSubtype="2" fill="hold" nodeType="clickEffect">
+                                <p:cTn id="5" presetID="1" presetClass="emph" presetSubtype="2" fill="hold" nodeType="clickEffect">
                                   <p:stCondLst>
                                     <p:cond delay="0"/>
                                   </p:stCondLst>
                                   <p:childTnLst>
                                     <p:animClr clrSpc="rgb" dir="cw">
                                       <p:cBhvr>
-                                        <p:cTn id="14" dur="1000" fill="hold"/>
+                                        <p:cTn id="6" dur="1000" fill="hold"/>
                                         <p:tgtEl>
                                           <p:spTgt spid="31"/>
                                         </p:tgtEl>
@@ -16654,7 +16484,7 @@
                                     </p:animClr>
                                     <p:set>
                                       <p:cBhvr>
-                                        <p:cTn id="15" dur="1000" fill="hold"/>
+                                        <p:cTn id="7" dur="1000" fill="hold"/>
                                         <p:tgtEl>
                                           <p:spTgt spid="31"/>
                                         </p:tgtEl>
@@ -16668,7 +16498,7 @@
                                     </p:set>
                                     <p:set>
                                       <p:cBhvr>
-                                        <p:cTn id="16" dur="1000" fill="hold"/>
+                                        <p:cTn id="8" dur="1000" fill="hold"/>
                                         <p:tgtEl>
                                           <p:spTgt spid="31"/>
                                         </p:tgtEl>
@@ -16684,14 +16514,14 @@
                                 </p:cTn>
                               </p:par>
                               <p:par>
-                                <p:cTn id="17" presetID="1" presetClass="emph" presetSubtype="2" fill="hold" nodeType="withEffect">
+                                <p:cTn id="9" presetID="1" presetClass="emph" presetSubtype="2" fill="hold" nodeType="withEffect">
                                   <p:stCondLst>
                                     <p:cond delay="0"/>
                                   </p:stCondLst>
                                   <p:childTnLst>
                                     <p:animClr clrSpc="rgb" dir="cw">
                                       <p:cBhvr>
-                                        <p:cTn id="18" dur="1000" fill="hold"/>
+                                        <p:cTn id="10" dur="1000" fill="hold"/>
                                         <p:tgtEl>
                                           <p:spTgt spid="34"/>
                                         </p:tgtEl>
@@ -16705,7 +16535,7 @@
                                     </p:animClr>
                                     <p:set>
                                       <p:cBhvr>
-                                        <p:cTn id="19" dur="1000" fill="hold"/>
+                                        <p:cTn id="11" dur="1000" fill="hold"/>
                                         <p:tgtEl>
                                           <p:spTgt spid="34"/>
                                         </p:tgtEl>
@@ -16719,7 +16549,7 @@
                                     </p:set>
                                     <p:set>
                                       <p:cBhvr>
-                                        <p:cTn id="20" dur="1000" fill="hold"/>
+                                        <p:cTn id="12" dur="1000" fill="hold"/>
                                         <p:tgtEl>
                                           <p:spTgt spid="34"/>
                                         </p:tgtEl>
@@ -16735,14 +16565,14 @@
                                 </p:cTn>
                               </p:par>
                               <p:par>
-                                <p:cTn id="21" presetID="1" presetClass="emph" presetSubtype="2" fill="hold" nodeType="withEffect">
+                                <p:cTn id="13" presetID="1" presetClass="emph" presetSubtype="2" fill="hold" nodeType="withEffect">
                                   <p:stCondLst>
                                     <p:cond delay="0"/>
                                   </p:stCondLst>
                                   <p:childTnLst>
                                     <p:animClr clrSpc="rgb" dir="cw">
                                       <p:cBhvr>
-                                        <p:cTn id="22" dur="1000" fill="hold"/>
+                                        <p:cTn id="14" dur="1000" fill="hold"/>
                                         <p:tgtEl>
                                           <p:spTgt spid="30"/>
                                         </p:tgtEl>
@@ -16756,7 +16586,7 @@
                                     </p:animClr>
                                     <p:set>
                                       <p:cBhvr>
-                                        <p:cTn id="23" dur="1000" fill="hold"/>
+                                        <p:cTn id="15" dur="1000" fill="hold"/>
                                         <p:tgtEl>
                                           <p:spTgt spid="30"/>
                                         </p:tgtEl>
@@ -16770,7 +16600,7 @@
                                     </p:set>
                                     <p:set>
                                       <p:cBhvr>
-                                        <p:cTn id="24" dur="1000" fill="hold"/>
+                                        <p:cTn id="16" dur="1000" fill="hold"/>
                                         <p:tgtEl>
                                           <p:spTgt spid="30"/>
                                         </p:tgtEl>
@@ -16792,26 +16622,26 @@
                     </p:cTn>
                   </p:par>
                   <p:par>
-                    <p:cTn id="25" fill="hold">
+                    <p:cTn id="17" fill="hold">
                       <p:stCondLst>
                         <p:cond delay="indefinite"/>
                       </p:stCondLst>
                       <p:childTnLst>
                         <p:par>
-                          <p:cTn id="26" fill="hold">
+                          <p:cTn id="18" fill="hold">
                             <p:stCondLst>
                               <p:cond delay="0"/>
                             </p:stCondLst>
                             <p:childTnLst>
                               <p:par>
-                                <p:cTn id="27" presetID="1" presetClass="entr" presetSubtype="0" fill="hold" grpId="0" nodeType="clickEffect">
+                                <p:cTn id="19" presetID="1" presetClass="entr" presetSubtype="0" fill="hold" grpId="0" nodeType="clickEffect">
                                   <p:stCondLst>
                                     <p:cond delay="0"/>
                                   </p:stCondLst>
                                   <p:childTnLst>
                                     <p:set>
                                       <p:cBhvr>
-                                        <p:cTn id="28" dur="1" fill="hold">
+                                        <p:cTn id="20" dur="1" fill="hold">
                                           <p:stCondLst>
                                             <p:cond delay="0"/>
                                           </p:stCondLst>
@@ -16831,14 +16661,14 @@
                                 </p:cTn>
                               </p:par>
                               <p:par>
-                                <p:cTn id="29" presetID="1" presetClass="entr" presetSubtype="0" fill="hold" nodeType="withEffect">
+                                <p:cTn id="21" presetID="1" presetClass="entr" presetSubtype="0" fill="hold" nodeType="withEffect">
                                   <p:stCondLst>
                                     <p:cond delay="0"/>
                                   </p:stCondLst>
                                   <p:childTnLst>
                                     <p:set>
                                       <p:cBhvr>
-                                        <p:cTn id="30" dur="1" fill="hold">
+                                        <p:cTn id="22" dur="1" fill="hold">
                                           <p:stCondLst>
                                             <p:cond delay="0"/>
                                           </p:stCondLst>
@@ -17194,7 +17024,7 @@
                 <a:ea typeface="Roboto Black" panose="02000000000000000000" pitchFamily="2" charset="0"/>
                 <a:cs typeface="Latha" panose="020B0604020202020204" pitchFamily="34" charset="0"/>
               </a:rPr>
-              <a:t>Câu 7: Cây sau khi thêm nút 12</a:t>
+              <a:t>Câu 7: Cây sau khi thêm node 12</a:t>
             </a:r>
           </a:p>
         </p:txBody>
@@ -18457,7 +18287,7 @@
                 <a:ea typeface="Roboto Black" panose="02000000000000000000" pitchFamily="2" charset="0"/>
                 <a:cs typeface="Latha" panose="020B0604020202020204" pitchFamily="34" charset="0"/>
               </a:rPr>
-              <a:t>Câu 8: Sau khi xóa nút 70 thì nút thay thế là : </a:t>
+              <a:t>Câu 8: Sau khi xóa node 70 thì node thay thế là : </a:t>
             </a:r>
           </a:p>
         </p:txBody>
@@ -19259,7 +19089,7 @@
                 <a:ea typeface="Calibri" panose="020F0502020204030204" pitchFamily="34" charset="0"/>
                 <a:cs typeface="Times New Roman" panose="02020603050405020304" pitchFamily="18" charset="0"/>
               </a:rPr>
-              <a:t>Nút 60, màu đen</a:t>
+              <a:t>Node 60, màu đen</a:t>
             </a:r>
             <a:endParaRPr lang="en-US" sz="2000">
               <a:effectLst/>
@@ -19306,7 +19136,7 @@
                 <a:ea typeface="Calibri" panose="020F0502020204030204" pitchFamily="34" charset="0"/>
                 <a:cs typeface="Times New Roman" panose="02020603050405020304" pitchFamily="18" charset="0"/>
               </a:rPr>
-              <a:t>Nút 80, màu đỏ</a:t>
+              <a:t>Node 80, màu đỏ</a:t>
             </a:r>
           </a:p>
           <a:p>
@@ -19347,7 +19177,7 @@
                 <a:ea typeface="Calibri" panose="020F0502020204030204" pitchFamily="34" charset="0"/>
                 <a:cs typeface="Times New Roman" panose="02020603050405020304" pitchFamily="18" charset="0"/>
               </a:rPr>
-              <a:t>Nút 65, màu đỏ</a:t>
+              <a:t>Node 65, màu đỏ</a:t>
             </a:r>
           </a:p>
           <a:p>
@@ -19388,7 +19218,7 @@
                 <a:ea typeface="Calibri" panose="020F0502020204030204" pitchFamily="34" charset="0"/>
                 <a:cs typeface="Times New Roman" panose="02020603050405020304" pitchFamily="18" charset="0"/>
               </a:rPr>
-              <a:t>Nút 65, màu đen</a:t>
+              <a:t>Node 65, màu đen</a:t>
             </a:r>
           </a:p>
           <a:p>
@@ -20120,7 +19950,7 @@
                 <a:ea typeface="Roboto Black" panose="02000000000000000000" pitchFamily="2" charset="0"/>
                 <a:cs typeface="Latha" panose="020B0604020202020204" pitchFamily="34" charset="0"/>
               </a:rPr>
-              <a:t>Câu 8: Sau khi xóa nút 70 thì nút thay thế là : </a:t>
+              <a:t>Câu 8: Sau khi xóa node 70 thì node thay thế là : </a:t>
             </a:r>
           </a:p>
         </p:txBody>
@@ -20922,7 +20752,7 @@
                 <a:ea typeface="Calibri" panose="020F0502020204030204" pitchFamily="34" charset="0"/>
                 <a:cs typeface="Times New Roman" panose="02020603050405020304" pitchFamily="18" charset="0"/>
               </a:rPr>
-              <a:t>Nút 60, màu đen</a:t>
+              <a:t>Node 60, màu đen</a:t>
             </a:r>
             <a:endParaRPr lang="en-US" sz="2000">
               <a:effectLst/>
@@ -20969,7 +20799,7 @@
                 <a:ea typeface="Calibri" panose="020F0502020204030204" pitchFamily="34" charset="0"/>
                 <a:cs typeface="Times New Roman" panose="02020603050405020304" pitchFamily="18" charset="0"/>
               </a:rPr>
-              <a:t>Nút 80, màu đỏ</a:t>
+              <a:t>Node 80, màu đỏ</a:t>
             </a:r>
           </a:p>
           <a:p>
@@ -21010,7 +20840,7 @@
                 <a:ea typeface="Calibri" panose="020F0502020204030204" pitchFamily="34" charset="0"/>
                 <a:cs typeface="Times New Roman" panose="02020603050405020304" pitchFamily="18" charset="0"/>
               </a:rPr>
-              <a:t>Nút 65, màu đỏ</a:t>
+              <a:t>Node 65, màu đỏ</a:t>
             </a:r>
           </a:p>
           <a:p>
@@ -21051,7 +20881,7 @@
                 <a:ea typeface="Calibri" panose="020F0502020204030204" pitchFamily="34" charset="0"/>
                 <a:cs typeface="Times New Roman" panose="02020603050405020304" pitchFamily="18" charset="0"/>
               </a:rPr>
-              <a:t>Nút 65, màu đen</a:t>
+              <a:t>Node 65, màu đen</a:t>
             </a:r>
           </a:p>
           <a:p>
@@ -21517,7 +21347,7 @@
                 <a:ea typeface="Roboto Black" panose="02000000000000000000" pitchFamily="2" charset="0"/>
                 <a:cs typeface="Latha" panose="020B0604020202020204" pitchFamily="34" charset="0"/>
               </a:rPr>
-              <a:t>Câu 9: Cây sau khi xóa nút 30</a:t>
+              <a:t>Câu 9: Cây sau khi xóa node 30</a:t>
             </a:r>
           </a:p>
         </p:txBody>
@@ -23897,7 +23727,7 @@
                 <a:ea typeface="Roboto Black" panose="02000000000000000000" pitchFamily="2" charset="0"/>
                 <a:cs typeface="Latha" panose="020B0604020202020204" pitchFamily="34" charset="0"/>
               </a:rPr>
-              <a:t>Câu 9: Cây sau khi xóa nút 30</a:t>
+              <a:t>Câu 9: Cây sau khi xóa node 30</a:t>
             </a:r>
           </a:p>
         </p:txBody>
@@ -24765,8 +24595,8 @@
           <a:p>
             <a:pPr algn="ctr"/>
             <a:r>
-              <a:rPr lang="en-US" sz="1200"/>
-              <a:t>NULL</a:t>
+              <a:rPr lang="en-US" sz="1100"/>
+              <a:t>NIL</a:t>
             </a:r>
             <a:endParaRPr lang="en-US"/>
           </a:p>
@@ -25640,7 +25470,7 @@
                 <a:ea typeface="Roboto Black" panose="02000000000000000000" pitchFamily="2" charset="0"/>
                 <a:cs typeface="Latha" panose="020B0604020202020204" pitchFamily="34" charset="0"/>
               </a:rPr>
-              <a:t>Câu 9: Cây sau khi xóa nút 30</a:t>
+              <a:t>Câu 9: Cây sau khi xóa node 30</a:t>
             </a:r>
           </a:p>
         </p:txBody>
@@ -26052,8 +25882,8 @@
           <a:p>
             <a:pPr algn="ctr"/>
             <a:r>
-              <a:rPr lang="en-US" sz="1200"/>
-              <a:t>NULL</a:t>
+              <a:rPr lang="en-US" sz="1100"/>
+              <a:t>NIL</a:t>
             </a:r>
             <a:endParaRPr lang="en-US"/>
           </a:p>
@@ -26562,7 +26392,7 @@
                 <a:ea typeface="Roboto Black" panose="02000000000000000000" pitchFamily="2" charset="0"/>
                 <a:cs typeface="Latha" panose="020B0604020202020204" pitchFamily="34" charset="0"/>
               </a:rPr>
-              <a:t>Câu 9: Cây sau khi xóa nút 30</a:t>
+              <a:t>Câu 9: Cây sau khi xóa node 30</a:t>
             </a:r>
           </a:p>
         </p:txBody>
@@ -26974,10 +26804,10 @@
           <a:p>
             <a:pPr algn="ctr"/>
             <a:r>
-              <a:rPr lang="en-US" sz="1200"/>
-              <a:t>NULL</a:t>
+              <a:rPr lang="en-US" sz="1100"/>
+              <a:t>NIL</a:t>
             </a:r>
-            <a:endParaRPr lang="en-US"/>
+            <a:endParaRPr lang="en-US" sz="1200"/>
           </a:p>
         </p:txBody>
       </p:sp>
@@ -28838,6 +28668,95 @@
           </a:fontRef>
         </p:style>
       </p:cxnSp>
+      <p:cxnSp>
+        <p:nvCxnSpPr>
+          <p:cNvPr id="15" name="Straight Connector 14">
+            <a:extLst>
+              <a:ext uri="{FF2B5EF4-FFF2-40B4-BE49-F238E27FC236}">
+                <a16:creationId xmlns:a16="http://schemas.microsoft.com/office/drawing/2014/main" id="{729E6D93-0517-45F3-B120-B2699EDD4C9C}"/>
+              </a:ext>
+            </a:extLst>
+          </p:cNvPr>
+          <p:cNvCxnSpPr>
+            <a:cxnSpLocks/>
+            <a:stCxn id="16" idx="0"/>
+            <a:endCxn id="27" idx="3"/>
+          </p:cNvCxnSpPr>
+          <p:nvPr/>
+        </p:nvCxnSpPr>
+        <p:spPr>
+          <a:xfrm flipV="1">
+            <a:off x="6762015" y="2830776"/>
+            <a:ext cx="408731" cy="310734"/>
+          </a:xfrm>
+          <a:prstGeom prst="line">
+            <a:avLst/>
+          </a:prstGeom>
+        </p:spPr>
+        <p:style>
+          <a:lnRef idx="1">
+            <a:schemeClr val="dk1"/>
+          </a:lnRef>
+          <a:fillRef idx="0">
+            <a:schemeClr val="dk1"/>
+          </a:fillRef>
+          <a:effectRef idx="0">
+            <a:schemeClr val="dk1"/>
+          </a:effectRef>
+          <a:fontRef idx="minor">
+            <a:schemeClr val="tx1"/>
+          </a:fontRef>
+        </p:style>
+      </p:cxnSp>
+      <p:sp>
+        <p:nvSpPr>
+          <p:cNvPr id="16" name="Oval 15">
+            <a:extLst>
+              <a:ext uri="{FF2B5EF4-FFF2-40B4-BE49-F238E27FC236}">
+                <a16:creationId xmlns:a16="http://schemas.microsoft.com/office/drawing/2014/main" id="{B585E2E7-B7DE-4432-BA8E-F1ED22094E40}"/>
+              </a:ext>
+            </a:extLst>
+          </p:cNvPr>
+          <p:cNvSpPr/>
+          <p:nvPr/>
+        </p:nvSpPr>
+        <p:spPr>
+          <a:xfrm>
+            <a:off x="6483706" y="3141510"/>
+            <a:ext cx="556618" cy="501802"/>
+          </a:xfrm>
+          <a:prstGeom prst="ellipse">
+            <a:avLst/>
+          </a:prstGeom>
+        </p:spPr>
+        <p:style>
+          <a:lnRef idx="2">
+            <a:schemeClr val="dk1">
+              <a:shade val="50000"/>
+            </a:schemeClr>
+          </a:lnRef>
+          <a:fillRef idx="1">
+            <a:schemeClr val="dk1"/>
+          </a:fillRef>
+          <a:effectRef idx="0">
+            <a:schemeClr val="dk1"/>
+          </a:effectRef>
+          <a:fontRef idx="minor">
+            <a:schemeClr val="lt1"/>
+          </a:fontRef>
+        </p:style>
+        <p:txBody>
+          <a:bodyPr rtlCol="0" anchor="ctr"/>
+          <a:lstStyle/>
+          <a:p>
+            <a:pPr algn="ctr"/>
+            <a:r>
+              <a:rPr lang="en-US" sz="1050"/>
+              <a:t>NIL</a:t>
+            </a:r>
+          </a:p>
+        </p:txBody>
+      </p:sp>
     </p:spTree>
     <p:extLst>
       <p:ext uri="{BB962C8B-B14F-4D97-AF65-F5344CB8AC3E}">
@@ -28955,6 +28874,182 @@
                       </p:childTnLst>
                     </p:cTn>
                   </p:par>
+                  <p:par>
+                    <p:cTn id="10" fill="hold">
+                      <p:stCondLst>
+                        <p:cond delay="indefinite"/>
+                      </p:stCondLst>
+                      <p:childTnLst>
+                        <p:par>
+                          <p:cTn id="11" fill="hold">
+                            <p:stCondLst>
+                              <p:cond delay="0"/>
+                            </p:stCondLst>
+                            <p:childTnLst>
+                              <p:par>
+                                <p:cTn id="12" presetID="22" presetClass="entr" presetSubtype="4" fill="hold" grpId="0" nodeType="clickEffect">
+                                  <p:stCondLst>
+                                    <p:cond delay="0"/>
+                                  </p:stCondLst>
+                                  <p:childTnLst>
+                                    <p:set>
+                                      <p:cBhvr>
+                                        <p:cTn id="13" dur="1" fill="hold">
+                                          <p:stCondLst>
+                                            <p:cond delay="0"/>
+                                          </p:stCondLst>
+                                        </p:cTn>
+                                        <p:tgtEl>
+                                          <p:spTgt spid="16"/>
+                                        </p:tgtEl>
+                                        <p:attrNameLst>
+                                          <p:attrName>style.visibility</p:attrName>
+                                        </p:attrNameLst>
+                                      </p:cBhvr>
+                                      <p:to>
+                                        <p:strVal val="visible"/>
+                                      </p:to>
+                                    </p:set>
+                                    <p:animEffect transition="in" filter="wipe(down)">
+                                      <p:cBhvr>
+                                        <p:cTn id="14" dur="500"/>
+                                        <p:tgtEl>
+                                          <p:spTgt spid="16"/>
+                                        </p:tgtEl>
+                                      </p:cBhvr>
+                                    </p:animEffect>
+                                  </p:childTnLst>
+                                </p:cTn>
+                              </p:par>
+                              <p:par>
+                                <p:cTn id="15" presetID="22" presetClass="entr" presetSubtype="4" fill="hold" nodeType="withEffect">
+                                  <p:stCondLst>
+                                    <p:cond delay="0"/>
+                                  </p:stCondLst>
+                                  <p:childTnLst>
+                                    <p:set>
+                                      <p:cBhvr>
+                                        <p:cTn id="16" dur="1" fill="hold">
+                                          <p:stCondLst>
+                                            <p:cond delay="0"/>
+                                          </p:stCondLst>
+                                        </p:cTn>
+                                        <p:tgtEl>
+                                          <p:spTgt spid="15"/>
+                                        </p:tgtEl>
+                                        <p:attrNameLst>
+                                          <p:attrName>style.visibility</p:attrName>
+                                        </p:attrNameLst>
+                                      </p:cBhvr>
+                                      <p:to>
+                                        <p:strVal val="visible"/>
+                                      </p:to>
+                                    </p:set>
+                                    <p:animEffect transition="in" filter="wipe(down)">
+                                      <p:cBhvr>
+                                        <p:cTn id="17" dur="500"/>
+                                        <p:tgtEl>
+                                          <p:spTgt spid="15"/>
+                                        </p:tgtEl>
+                                      </p:cBhvr>
+                                    </p:animEffect>
+                                  </p:childTnLst>
+                                </p:cTn>
+                              </p:par>
+                            </p:childTnLst>
+                          </p:cTn>
+                        </p:par>
+                      </p:childTnLst>
+                    </p:cTn>
+                  </p:par>
+                  <p:par>
+                    <p:cTn id="18" fill="hold">
+                      <p:stCondLst>
+                        <p:cond delay="indefinite"/>
+                      </p:stCondLst>
+                      <p:childTnLst>
+                        <p:par>
+                          <p:cTn id="19" fill="hold">
+                            <p:stCondLst>
+                              <p:cond delay="0"/>
+                            </p:stCondLst>
+                            <p:childTnLst>
+                              <p:par>
+                                <p:cTn id="20" presetID="10" presetClass="exit" presetSubtype="0" fill="hold" grpId="1" nodeType="clickEffect">
+                                  <p:stCondLst>
+                                    <p:cond delay="0"/>
+                                  </p:stCondLst>
+                                  <p:childTnLst>
+                                    <p:animEffect transition="out" filter="fade">
+                                      <p:cBhvr>
+                                        <p:cTn id="21" dur="500"/>
+                                        <p:tgtEl>
+                                          <p:spTgt spid="16"/>
+                                        </p:tgtEl>
+                                      </p:cBhvr>
+                                    </p:animEffect>
+                                    <p:set>
+                                      <p:cBhvr>
+                                        <p:cTn id="22" dur="1" fill="hold">
+                                          <p:stCondLst>
+                                            <p:cond delay="499"/>
+                                          </p:stCondLst>
+                                        </p:cTn>
+                                        <p:tgtEl>
+                                          <p:spTgt spid="16"/>
+                                        </p:tgtEl>
+                                        <p:attrNameLst>
+                                          <p:attrName>style.visibility</p:attrName>
+                                        </p:attrNameLst>
+                                      </p:cBhvr>
+                                      <p:to>
+                                        <p:strVal val="hidden"/>
+                                      </p:to>
+                                    </p:set>
+                                  </p:childTnLst>
+                                </p:cTn>
+                              </p:par>
+                              <p:par>
+                                <p:cTn id="23" presetID="10" presetClass="exit" presetSubtype="0" fill="hold" nodeType="withEffect">
+                                  <p:stCondLst>
+                                    <p:cond delay="0"/>
+                                  </p:stCondLst>
+                                  <p:childTnLst>
+                                    <p:animEffect transition="out" filter="fade">
+                                      <p:cBhvr>
+                                        <p:cTn id="24" dur="500"/>
+                                        <p:tgtEl>
+                                          <p:spTgt spid="15"/>
+                                        </p:tgtEl>
+                                      </p:cBhvr>
+                                    </p:animEffect>
+                                    <p:set>
+                                      <p:cBhvr>
+                                        <p:cTn id="25" dur="1" fill="hold">
+                                          <p:stCondLst>
+                                            <p:cond delay="499"/>
+                                          </p:stCondLst>
+                                        </p:cTn>
+                                        <p:tgtEl>
+                                          <p:spTgt spid="15"/>
+                                        </p:tgtEl>
+                                        <p:attrNameLst>
+                                          <p:attrName>style.visibility</p:attrName>
+                                        </p:attrNameLst>
+                                      </p:cBhvr>
+                                      <p:to>
+                                        <p:strVal val="hidden"/>
+                                      </p:to>
+                                    </p:set>
+                                  </p:childTnLst>
+                                </p:cTn>
+                              </p:par>
+                            </p:childTnLst>
+                          </p:cTn>
+                        </p:par>
+                      </p:childTnLst>
+                    </p:cTn>
+                  </p:par>
                 </p:childTnLst>
               </p:cTn>
               <p:prevCondLst>
@@ -28978,6 +29073,8 @@
     </p:tnLst>
     <p:bldLst>
       <p:bldP spid="23" grpId="0" animBg="1"/>
+      <p:bldP spid="16" grpId="0" animBg="1"/>
+      <p:bldP spid="16" grpId="1" animBg="1"/>
     </p:bldLst>
   </p:timing>
 </p:sld>
@@ -30985,7 +31082,7 @@
                 <a:ea typeface="Calibri" panose="020F0502020204030204" pitchFamily="34" charset="0"/>
                 <a:cs typeface="Times New Roman" panose="02020603050405020304" pitchFamily="18" charset="0"/>
               </a:rPr>
-              <a:t> Nút cha màu đỏ thì có thể có nút con màu đỏ</a:t>
+              <a:t> Node cha màu đỏ thì có thể có node con màu đỏ</a:t>
             </a:r>
           </a:p>
           <a:p>
@@ -31008,7 +31105,7 @@
                 <a:ea typeface="Calibri" panose="020F0502020204030204" pitchFamily="34" charset="0"/>
                 <a:cs typeface="Times New Roman" panose="02020603050405020304" pitchFamily="18" charset="0"/>
               </a:rPr>
-              <a:t>Nếu một nút có màu đỏ thì 2 nút con của nó sẽ có màu đen</a:t>
+              <a:t>Nếu một node có màu đỏ thì 2 node con của nó sẽ có màu đen</a:t>
             </a:r>
           </a:p>
           <a:p>
@@ -31028,7 +31125,7 @@
                 <a:ea typeface="Calibri" panose="020F0502020204030204" pitchFamily="34" charset="0"/>
                 <a:cs typeface="Times New Roman" panose="02020603050405020304" pitchFamily="18" charset="0"/>
               </a:rPr>
-              <a:t>Chỉ có nút gốc và nút lá (null) có màu đen</a:t>
+              <a:t>Chỉ có node gốc và node lá (null) có màu đen</a:t>
             </a:r>
           </a:p>
           <a:p>
@@ -31048,7 +31145,7 @@
                 <a:ea typeface="Calibri" panose="020F0502020204030204" pitchFamily="34" charset="0"/>
                 <a:cs typeface="Times New Roman" panose="02020603050405020304" pitchFamily="18" charset="0"/>
               </a:rPr>
-              <a:t>Mọi đường dẫn từ một nút đến bất kỳ nút NULL nào trong số các nút con của nó đều có cùng số lượng nút đen</a:t>
+              <a:t>Mọi đường dẫn từ một node đến bất kỳ node NULL nào trong số các node con của nó đều có cùng số lượng node đen</a:t>
             </a:r>
             <a:endParaRPr lang="en-US" sz="2000">
               <a:latin typeface="Times New Roman" panose="02020603050405020304" pitchFamily="18" charset="0"/>
@@ -33145,7 +33242,7 @@
                 <a:ea typeface="Roboto Black" panose="02000000000000000000" pitchFamily="2" charset="0"/>
                 <a:cs typeface="Latha" panose="020B0604020202020204" pitchFamily="34" charset="0"/>
               </a:rPr>
-              <a:t>Câu 2: Nếu thêm 1 nút mới vào cây thì nút đó sẽ có màu gì nếu nó không phải là gốc ?</a:t>
+              <a:t>Câu 2: Nếu thêm 1 node mới vào cây thì node đó sẽ có màu gì nếu nó không phải là gốc ?</a:t>
             </a:r>
           </a:p>
         </p:txBody>
@@ -34138,7 +34235,7 @@
                 <a:ea typeface="Roboto Black" panose="02000000000000000000" pitchFamily="2" charset="0"/>
                 <a:cs typeface="Latha" panose="020B0604020202020204" pitchFamily="34" charset="0"/>
               </a:rPr>
-              <a:t>Câu 3: Chiều cao đen của nút 9</a:t>
+              <a:t>Câu 3: Chiều cao đen của node 9</a:t>
             </a:r>
           </a:p>
         </p:txBody>
@@ -34686,9 +34783,10 @@
           <a:p>
             <a:pPr algn="ctr"/>
             <a:r>
-              <a:rPr lang="en-US" sz="1000"/>
-              <a:t>NULL</a:t>
+              <a:rPr lang="en-US" sz="1100"/>
+              <a:t>NIL</a:t>
             </a:r>
+            <a:endParaRPr lang="en-US" sz="1000"/>
           </a:p>
         </p:txBody>
       </p:sp>
@@ -34828,7 +34926,7 @@
             <a:pPr algn="ctr"/>
             <a:r>
               <a:rPr lang="en-US" sz="1000"/>
-              <a:t>NULL</a:t>
+              <a:t>NIL</a:t>
             </a:r>
           </a:p>
         </p:txBody>
@@ -34926,7 +35024,7 @@
             <a:pPr algn="ctr"/>
             <a:r>
               <a:rPr lang="en-US" sz="1000"/>
-              <a:t>NULL</a:t>
+              <a:t>NIL</a:t>
             </a:r>
           </a:p>
         </p:txBody>
@@ -35095,7 +35193,7 @@
             <a:pPr algn="ctr"/>
             <a:r>
               <a:rPr lang="en-US" sz="1000"/>
-              <a:t>NULL</a:t>
+              <a:t>NIL</a:t>
             </a:r>
           </a:p>
         </p:txBody>
@@ -35224,7 +35322,7 @@
             <a:pPr algn="ctr"/>
             <a:r>
               <a:rPr lang="en-US" sz="1000"/>
-              <a:t>NULL</a:t>
+              <a:t>NIL</a:t>
             </a:r>
           </a:p>
         </p:txBody>
@@ -35273,7 +35371,7 @@
             <a:pPr algn="ctr"/>
             <a:r>
               <a:rPr lang="en-US" sz="1000"/>
-              <a:t>NULL</a:t>
+              <a:t>NIL</a:t>
             </a:r>
           </a:p>
         </p:txBody>
@@ -35402,7 +35500,7 @@
             <a:pPr algn="ctr"/>
             <a:r>
               <a:rPr lang="en-US" sz="1000"/>
-              <a:t>NULL</a:t>
+              <a:t>NIL</a:t>
             </a:r>
           </a:p>
         </p:txBody>
@@ -37781,7 +37879,7 @@
                 <a:ea typeface="Roboto Black" panose="02000000000000000000" pitchFamily="2" charset="0"/>
                 <a:cs typeface="Latha" panose="020B0604020202020204" pitchFamily="34" charset="0"/>
               </a:rPr>
-              <a:t>Câu 5: Điều nào là sai khi thêm 1 nút vào cây</a:t>
+              <a:t>Câu 5: Điều nào là sai khi thêm 1 node vào cây</a:t>
             </a:r>
           </a:p>
         </p:txBody>
@@ -38111,7 +38209,7 @@
                 <a:ea typeface="Calibri" panose="020F0502020204030204" pitchFamily="34" charset="0"/>
                 <a:cs typeface="Times New Roman" panose="02020603050405020304" pitchFamily="18" charset="0"/>
               </a:rPr>
-              <a:t>Nút thêm vào có màu đỏ nếu nó không phải gốc</a:t>
+              <a:t>Node thêm vào có màu đỏ nếu nó không phải gốc</a:t>
             </a:r>
           </a:p>
           <a:p>
@@ -38133,7 +38231,7 @@
                 <a:ea typeface="Calibri" panose="020F0502020204030204" pitchFamily="34" charset="0"/>
                 <a:cs typeface="Times New Roman" panose="02020603050405020304" pitchFamily="18" charset="0"/>
               </a:rPr>
-              <a:t>Nút cha là màu đen thì không cần đổi màu nút thêm</a:t>
+              <a:t>Node cha là màu đen thì không cần đổi màu node thêm</a:t>
             </a:r>
           </a:p>
           <a:p>
@@ -38155,7 +38253,7 @@
                 <a:ea typeface="Calibri" panose="020F0502020204030204" pitchFamily="34" charset="0"/>
                 <a:cs typeface="Times New Roman" panose="02020603050405020304" pitchFamily="18" charset="0"/>
               </a:rPr>
-              <a:t>Nút thêm vào là gốc thì sẽ có màu đỏ </a:t>
+              <a:t>Node thêm vào là gốc thì sẽ có màu đỏ </a:t>
             </a:r>
           </a:p>
           <a:p>
@@ -38855,8 +38953,8 @@
           <a:p>
             <a:pPr algn="ctr"/>
             <a:r>
-              <a:rPr lang="en-US" sz="1200"/>
-              <a:t>NULL</a:t>
+              <a:rPr lang="en-US" sz="1100"/>
+              <a:t>NIL</a:t>
             </a:r>
           </a:p>
         </p:txBody>
@@ -40982,7 +41080,7 @@
                 <a:ea typeface="Roboto Black" panose="02000000000000000000" pitchFamily="2" charset="0"/>
                 <a:cs typeface="Latha" panose="020B0604020202020204" pitchFamily="34" charset="0"/>
               </a:rPr>
-              <a:t>Câu 7: Cây sau khi thêm nút 12</a:t>
+              <a:t>Câu 7: Cây sau khi thêm node 12</a:t>
             </a:r>
           </a:p>
         </p:txBody>

</xml_diff>